<commit_message>
[FIX]-strategy and schemi algoritmi
</commit_message>
<xml_diff>
--- a/Documentation/Presentation/Schema_algoritmo.pptx
+++ b/Documentation/Presentation/Schema_algoritmo.pptx
@@ -8,6 +8,7 @@
     <p:sldId id="256" r:id="rId2"/>
     <p:sldId id="257" r:id="rId3"/>
     <p:sldId id="258" r:id="rId4"/>
+    <p:sldId id="259" r:id="rId5"/>
   </p:sldIdLst>
   <p:sldSz cx="9144000" cy="6858000" type="screen4x3"/>
   <p:notesSz cx="6858000" cy="9144000"/>
@@ -245,7 +246,7 @@
           <a:p>
             <a:fld id="{3CBFA856-8E80-4C95-8BB8-8F6EC752AC93}" type="datetimeFigureOut">
               <a:rPr lang="it-IT" smtClean="0"/>
-              <a:t>09/07/2020</a:t>
+              <a:t>14/07/20</a:t>
             </a:fld>
             <a:endParaRPr lang="it-IT"/>
           </a:p>
@@ -415,7 +416,7 @@
           <a:p>
             <a:fld id="{3CBFA856-8E80-4C95-8BB8-8F6EC752AC93}" type="datetimeFigureOut">
               <a:rPr lang="it-IT" smtClean="0"/>
-              <a:t>09/07/2020</a:t>
+              <a:t>14/07/20</a:t>
             </a:fld>
             <a:endParaRPr lang="it-IT"/>
           </a:p>
@@ -595,7 +596,7 @@
           <a:p>
             <a:fld id="{3CBFA856-8E80-4C95-8BB8-8F6EC752AC93}" type="datetimeFigureOut">
               <a:rPr lang="it-IT" smtClean="0"/>
-              <a:t>09/07/2020</a:t>
+              <a:t>14/07/20</a:t>
             </a:fld>
             <a:endParaRPr lang="it-IT"/>
           </a:p>
@@ -765,7 +766,7 @@
           <a:p>
             <a:fld id="{3CBFA856-8E80-4C95-8BB8-8F6EC752AC93}" type="datetimeFigureOut">
               <a:rPr lang="it-IT" smtClean="0"/>
-              <a:t>09/07/2020</a:t>
+              <a:t>14/07/20</a:t>
             </a:fld>
             <a:endParaRPr lang="it-IT"/>
           </a:p>
@@ -1009,7 +1010,7 @@
           <a:p>
             <a:fld id="{3CBFA856-8E80-4C95-8BB8-8F6EC752AC93}" type="datetimeFigureOut">
               <a:rPr lang="it-IT" smtClean="0"/>
-              <a:t>09/07/2020</a:t>
+              <a:t>14/07/20</a:t>
             </a:fld>
             <a:endParaRPr lang="it-IT"/>
           </a:p>
@@ -1241,7 +1242,7 @@
           <a:p>
             <a:fld id="{3CBFA856-8E80-4C95-8BB8-8F6EC752AC93}" type="datetimeFigureOut">
               <a:rPr lang="it-IT" smtClean="0"/>
-              <a:t>09/07/2020</a:t>
+              <a:t>14/07/20</a:t>
             </a:fld>
             <a:endParaRPr lang="it-IT"/>
           </a:p>
@@ -1608,7 +1609,7 @@
           <a:p>
             <a:fld id="{3CBFA856-8E80-4C95-8BB8-8F6EC752AC93}" type="datetimeFigureOut">
               <a:rPr lang="it-IT" smtClean="0"/>
-              <a:t>09/07/2020</a:t>
+              <a:t>14/07/20</a:t>
             </a:fld>
             <a:endParaRPr lang="it-IT"/>
           </a:p>
@@ -1726,7 +1727,7 @@
           <a:p>
             <a:fld id="{3CBFA856-8E80-4C95-8BB8-8F6EC752AC93}" type="datetimeFigureOut">
               <a:rPr lang="it-IT" smtClean="0"/>
-              <a:t>09/07/2020</a:t>
+              <a:t>14/07/20</a:t>
             </a:fld>
             <a:endParaRPr lang="it-IT"/>
           </a:p>
@@ -1821,7 +1822,7 @@
           <a:p>
             <a:fld id="{3CBFA856-8E80-4C95-8BB8-8F6EC752AC93}" type="datetimeFigureOut">
               <a:rPr lang="it-IT" smtClean="0"/>
-              <a:t>09/07/2020</a:t>
+              <a:t>14/07/20</a:t>
             </a:fld>
             <a:endParaRPr lang="it-IT"/>
           </a:p>
@@ -2098,7 +2099,7 @@
           <a:p>
             <a:fld id="{3CBFA856-8E80-4C95-8BB8-8F6EC752AC93}" type="datetimeFigureOut">
               <a:rPr lang="it-IT" smtClean="0"/>
-              <a:t>09/07/2020</a:t>
+              <a:t>14/07/20</a:t>
             </a:fld>
             <a:endParaRPr lang="it-IT"/>
           </a:p>
@@ -2355,7 +2356,7 @@
           <a:p>
             <a:fld id="{3CBFA856-8E80-4C95-8BB8-8F6EC752AC93}" type="datetimeFigureOut">
               <a:rPr lang="it-IT" smtClean="0"/>
-              <a:t>09/07/2020</a:t>
+              <a:t>14/07/20</a:t>
             </a:fld>
             <a:endParaRPr lang="it-IT"/>
           </a:p>
@@ -2568,7 +2569,7 @@
           <a:p>
             <a:fld id="{3CBFA856-8E80-4C95-8BB8-8F6EC752AC93}" type="datetimeFigureOut">
               <a:rPr lang="it-IT" smtClean="0"/>
-              <a:t>09/07/2020</a:t>
+              <a:t>14/07/20</a:t>
             </a:fld>
             <a:endParaRPr lang="it-IT"/>
           </a:p>
@@ -6486,6 +6487,687 @@
 </p:sld>
 </file>
 
+<file path=ppt/slides/slide4.xml><?xml version="1.0" encoding="utf-8"?>
+<p:sld xmlns:a="http://schemas.openxmlformats.org/drawingml/2006/main" xmlns:r="http://schemas.openxmlformats.org/officeDocument/2006/relationships" xmlns:p="http://schemas.openxmlformats.org/presentationml/2006/main">
+  <p:cSld>
+    <p:spTree>
+      <p:nvGrpSpPr>
+        <p:cNvPr id="1" name=""/>
+        <p:cNvGrpSpPr/>
+        <p:nvPr/>
+      </p:nvGrpSpPr>
+      <p:grpSpPr>
+        <a:xfrm>
+          <a:off x="0" y="0"/>
+          <a:ext cx="0" cy="0"/>
+          <a:chOff x="0" y="0"/>
+          <a:chExt cx="0" cy="0"/>
+        </a:xfrm>
+      </p:grpSpPr>
+      <p:sp>
+        <p:nvSpPr>
+          <p:cNvPr id="5" name="Ovale 4">
+            <a:extLst>
+              <a:ext uri="{FF2B5EF4-FFF2-40B4-BE49-F238E27FC236}">
+                <a16:creationId xmlns:a16="http://schemas.microsoft.com/office/drawing/2014/main" id="{267A2E52-AA3B-482D-A657-9874ED436E3D}"/>
+              </a:ext>
+            </a:extLst>
+          </p:cNvPr>
+          <p:cNvSpPr/>
+          <p:nvPr/>
+        </p:nvSpPr>
+        <p:spPr>
+          <a:xfrm>
+            <a:off x="3435473" y="332432"/>
+            <a:ext cx="1782570" cy="916289"/>
+          </a:xfrm>
+          <a:prstGeom prst="ellipse">
+            <a:avLst/>
+          </a:prstGeom>
+        </p:spPr>
+        <p:style>
+          <a:lnRef idx="2">
+            <a:schemeClr val="accent1">
+              <a:shade val="50000"/>
+            </a:schemeClr>
+          </a:lnRef>
+          <a:fillRef idx="1">
+            <a:schemeClr val="accent1"/>
+          </a:fillRef>
+          <a:effectRef idx="0">
+            <a:schemeClr val="accent1"/>
+          </a:effectRef>
+          <a:fontRef idx="minor">
+            <a:schemeClr val="lt1"/>
+          </a:fontRef>
+        </p:style>
+        <p:txBody>
+          <a:bodyPr rtlCol="0" anchor="ctr"/>
+          <a:lstStyle/>
+          <a:p>
+            <a:pPr algn="ctr"/>
+            <a:r>
+              <a:rPr lang="it-IT" sz="1400" dirty="0"/>
+              <a:t>Ora massima di utilizzo batteria</a:t>
+            </a:r>
+          </a:p>
+        </p:txBody>
+      </p:sp>
+      <p:sp>
+        <p:nvSpPr>
+          <p:cNvPr id="7" name="Rettangolo 6">
+            <a:extLst>
+              <a:ext uri="{FF2B5EF4-FFF2-40B4-BE49-F238E27FC236}">
+                <a16:creationId xmlns:a16="http://schemas.microsoft.com/office/drawing/2014/main" id="{751E048F-344C-4287-801B-471022608DA8}"/>
+              </a:ext>
+            </a:extLst>
+          </p:cNvPr>
+          <p:cNvSpPr/>
+          <p:nvPr/>
+        </p:nvSpPr>
+        <p:spPr>
+          <a:xfrm>
+            <a:off x="3458401" y="1617904"/>
+            <a:ext cx="1736713" cy="608090"/>
+          </a:xfrm>
+          <a:prstGeom prst="rect">
+            <a:avLst/>
+          </a:prstGeom>
+        </p:spPr>
+        <p:style>
+          <a:lnRef idx="2">
+            <a:schemeClr val="accent1">
+              <a:shade val="50000"/>
+            </a:schemeClr>
+          </a:lnRef>
+          <a:fillRef idx="1">
+            <a:schemeClr val="accent1"/>
+          </a:fillRef>
+          <a:effectRef idx="0">
+            <a:schemeClr val="accent1"/>
+          </a:effectRef>
+          <a:fontRef idx="minor">
+            <a:schemeClr val="lt1"/>
+          </a:fontRef>
+        </p:style>
+        <p:txBody>
+          <a:bodyPr rtlCol="0" anchor="ctr"/>
+          <a:lstStyle/>
+          <a:p>
+            <a:pPr algn="ctr"/>
+            <a:r>
+              <a:rPr lang="it-IT" sz="1400" dirty="0"/>
+              <a:t>Calcolo residuo di energia batteria(</a:t>
+            </a:r>
+            <a:r>
+              <a:rPr lang="it-IT" sz="1400" dirty="0" err="1"/>
+              <a:t>i,j,k</a:t>
+            </a:r>
+            <a:r>
+              <a:rPr lang="it-IT" sz="1400" dirty="0"/>
+              <a:t>)</a:t>
+            </a:r>
+          </a:p>
+        </p:txBody>
+      </p:sp>
+      <p:sp>
+        <p:nvSpPr>
+          <p:cNvPr id="9" name="Rettangolo 8">
+            <a:extLst>
+              <a:ext uri="{FF2B5EF4-FFF2-40B4-BE49-F238E27FC236}">
+                <a16:creationId xmlns:a16="http://schemas.microsoft.com/office/drawing/2014/main" id="{1973AB70-CD94-4E87-8978-1DEFD37ABFC1}"/>
+              </a:ext>
+            </a:extLst>
+          </p:cNvPr>
+          <p:cNvSpPr/>
+          <p:nvPr/>
+        </p:nvSpPr>
+        <p:spPr>
+          <a:xfrm>
+            <a:off x="3527558" y="2485289"/>
+            <a:ext cx="1598400" cy="494970"/>
+          </a:xfrm>
+          <a:prstGeom prst="rect">
+            <a:avLst/>
+          </a:prstGeom>
+        </p:spPr>
+        <p:style>
+          <a:lnRef idx="2">
+            <a:schemeClr val="accent1">
+              <a:shade val="50000"/>
+            </a:schemeClr>
+          </a:lnRef>
+          <a:fillRef idx="1">
+            <a:schemeClr val="accent1"/>
+          </a:fillRef>
+          <a:effectRef idx="0">
+            <a:schemeClr val="accent1"/>
+          </a:effectRef>
+          <a:fontRef idx="minor">
+            <a:schemeClr val="lt1"/>
+          </a:fontRef>
+        </p:style>
+        <p:txBody>
+          <a:bodyPr rtlCol="0" anchor="ctr"/>
+          <a:lstStyle/>
+          <a:p>
+            <a:pPr algn="ctr"/>
+            <a:r>
+              <a:rPr lang="it-IT" sz="1400" dirty="0"/>
+              <a:t>Prendi (capacità, </a:t>
+            </a:r>
+            <a:r>
+              <a:rPr lang="it-IT" sz="1400" dirty="0" err="1"/>
+              <a:t>potenzaInputEnel</a:t>
+            </a:r>
+            <a:r>
+              <a:rPr lang="it-IT" sz="1400" dirty="0"/>
+              <a:t>) </a:t>
+            </a:r>
+          </a:p>
+        </p:txBody>
+      </p:sp>
+      <p:sp>
+        <p:nvSpPr>
+          <p:cNvPr id="11" name="Rettangolo 10">
+            <a:extLst>
+              <a:ext uri="{FF2B5EF4-FFF2-40B4-BE49-F238E27FC236}">
+                <a16:creationId xmlns:a16="http://schemas.microsoft.com/office/drawing/2014/main" id="{9AD2E938-FF20-4F25-B778-A17556407249}"/>
+              </a:ext>
+            </a:extLst>
+          </p:cNvPr>
+          <p:cNvSpPr/>
+          <p:nvPr/>
+        </p:nvSpPr>
+        <p:spPr>
+          <a:xfrm>
+            <a:off x="3527558" y="3226614"/>
+            <a:ext cx="1598400" cy="729161"/>
+          </a:xfrm>
+          <a:prstGeom prst="rect">
+            <a:avLst/>
+          </a:prstGeom>
+        </p:spPr>
+        <p:style>
+          <a:lnRef idx="2">
+            <a:schemeClr val="accent1">
+              <a:shade val="50000"/>
+            </a:schemeClr>
+          </a:lnRef>
+          <a:fillRef idx="1">
+            <a:schemeClr val="accent1"/>
+          </a:fillRef>
+          <a:effectRef idx="0">
+            <a:schemeClr val="accent1"/>
+          </a:effectRef>
+          <a:fontRef idx="minor">
+            <a:schemeClr val="lt1"/>
+          </a:fontRef>
+        </p:style>
+        <p:txBody>
+          <a:bodyPr rtlCol="0" anchor="ctr"/>
+          <a:lstStyle/>
+          <a:p>
+            <a:pPr algn="ctr"/>
+            <a:r>
+              <a:rPr lang="it-IT" sz="1400" dirty="0"/>
+              <a:t>Calcola ore di ricarica(</a:t>
+            </a:r>
+            <a:r>
+              <a:rPr lang="it-IT" sz="1400" dirty="0" err="1"/>
+              <a:t>i,j,k</a:t>
+            </a:r>
+            <a:r>
+              <a:rPr lang="it-IT" sz="1400" dirty="0"/>
+              <a:t>)</a:t>
+            </a:r>
+          </a:p>
+        </p:txBody>
+      </p:sp>
+      <p:cxnSp>
+        <p:nvCxnSpPr>
+          <p:cNvPr id="15" name="Connettore 2 14">
+            <a:extLst>
+              <a:ext uri="{FF2B5EF4-FFF2-40B4-BE49-F238E27FC236}">
+                <a16:creationId xmlns:a16="http://schemas.microsoft.com/office/drawing/2014/main" id="{63DFD987-8641-4C74-9CCB-18E6FCE50FD3}"/>
+              </a:ext>
+            </a:extLst>
+          </p:cNvPr>
+          <p:cNvCxnSpPr>
+            <a:cxnSpLocks/>
+            <a:stCxn id="7" idx="2"/>
+            <a:endCxn id="9" idx="0"/>
+          </p:cNvCxnSpPr>
+          <p:nvPr/>
+        </p:nvCxnSpPr>
+        <p:spPr>
+          <a:xfrm>
+            <a:off x="4326758" y="2225994"/>
+            <a:ext cx="0" cy="259295"/>
+          </a:xfrm>
+          <a:prstGeom prst="straightConnector1">
+            <a:avLst/>
+          </a:prstGeom>
+          <a:ln>
+            <a:tailEnd type="triangle"/>
+          </a:ln>
+        </p:spPr>
+        <p:style>
+          <a:lnRef idx="1">
+            <a:schemeClr val="accent1"/>
+          </a:lnRef>
+          <a:fillRef idx="0">
+            <a:schemeClr val="accent1"/>
+          </a:fillRef>
+          <a:effectRef idx="0">
+            <a:schemeClr val="accent1"/>
+          </a:effectRef>
+          <a:fontRef idx="minor">
+            <a:schemeClr val="tx1"/>
+          </a:fontRef>
+        </p:style>
+      </p:cxnSp>
+      <p:cxnSp>
+        <p:nvCxnSpPr>
+          <p:cNvPr id="17" name="Connettore 2 16">
+            <a:extLst>
+              <a:ext uri="{FF2B5EF4-FFF2-40B4-BE49-F238E27FC236}">
+                <a16:creationId xmlns:a16="http://schemas.microsoft.com/office/drawing/2014/main" id="{57642B90-6026-4475-BFDD-5B5A42D069DB}"/>
+              </a:ext>
+            </a:extLst>
+          </p:cNvPr>
+          <p:cNvCxnSpPr>
+            <a:cxnSpLocks/>
+            <a:stCxn id="9" idx="2"/>
+            <a:endCxn id="11" idx="0"/>
+          </p:cNvCxnSpPr>
+          <p:nvPr/>
+        </p:nvCxnSpPr>
+        <p:spPr>
+          <a:xfrm>
+            <a:off x="4326758" y="2980259"/>
+            <a:ext cx="0" cy="246355"/>
+          </a:xfrm>
+          <a:prstGeom prst="straightConnector1">
+            <a:avLst/>
+          </a:prstGeom>
+          <a:ln>
+            <a:tailEnd type="triangle"/>
+          </a:ln>
+        </p:spPr>
+        <p:style>
+          <a:lnRef idx="1">
+            <a:schemeClr val="accent1"/>
+          </a:lnRef>
+          <a:fillRef idx="0">
+            <a:schemeClr val="accent1"/>
+          </a:fillRef>
+          <a:effectRef idx="0">
+            <a:schemeClr val="accent1"/>
+          </a:effectRef>
+          <a:fontRef idx="minor">
+            <a:schemeClr val="tx1"/>
+          </a:fontRef>
+        </p:style>
+      </p:cxnSp>
+      <p:sp>
+        <p:nvSpPr>
+          <p:cNvPr id="19" name="Rettangolo 18">
+            <a:extLst>
+              <a:ext uri="{FF2B5EF4-FFF2-40B4-BE49-F238E27FC236}">
+                <a16:creationId xmlns:a16="http://schemas.microsoft.com/office/drawing/2014/main" id="{A6CAAB36-19D4-44D4-BA76-BD1E16F1CB6E}"/>
+              </a:ext>
+            </a:extLst>
+          </p:cNvPr>
+          <p:cNvSpPr/>
+          <p:nvPr/>
+        </p:nvSpPr>
+        <p:spPr>
+          <a:xfrm>
+            <a:off x="3059101" y="4286308"/>
+            <a:ext cx="2535312" cy="691397"/>
+          </a:xfrm>
+          <a:prstGeom prst="rect">
+            <a:avLst/>
+          </a:prstGeom>
+        </p:spPr>
+        <p:style>
+          <a:lnRef idx="2">
+            <a:schemeClr val="accent1">
+              <a:shade val="50000"/>
+            </a:schemeClr>
+          </a:lnRef>
+          <a:fillRef idx="1">
+            <a:schemeClr val="accent1"/>
+          </a:fillRef>
+          <a:effectRef idx="0">
+            <a:schemeClr val="accent1"/>
+          </a:effectRef>
+          <a:fontRef idx="minor">
+            <a:schemeClr val="lt1"/>
+          </a:fontRef>
+        </p:style>
+        <p:txBody>
+          <a:bodyPr rtlCol="0" anchor="ctr"/>
+          <a:lstStyle/>
+          <a:p>
+            <a:pPr algn="ctr"/>
+            <a:r>
+              <a:rPr lang="it-IT" sz="1400" dirty="0"/>
+              <a:t>Calcola l’ora in cui sei per cui ci vogliono quelle ore di ricarica</a:t>
+            </a:r>
+          </a:p>
+        </p:txBody>
+      </p:sp>
+      <p:sp>
+        <p:nvSpPr>
+          <p:cNvPr id="21" name="Rettangolo 20">
+            <a:extLst>
+              <a:ext uri="{FF2B5EF4-FFF2-40B4-BE49-F238E27FC236}">
+                <a16:creationId xmlns:a16="http://schemas.microsoft.com/office/drawing/2014/main" id="{8679D850-C7B1-401B-B6FC-D3A0C6BC449F}"/>
+              </a:ext>
+            </a:extLst>
+          </p:cNvPr>
+          <p:cNvSpPr/>
+          <p:nvPr/>
+        </p:nvSpPr>
+        <p:spPr>
+          <a:xfrm>
+            <a:off x="3240107" y="5306211"/>
+            <a:ext cx="2173299" cy="567557"/>
+          </a:xfrm>
+          <a:prstGeom prst="rect">
+            <a:avLst/>
+          </a:prstGeom>
+        </p:spPr>
+        <p:style>
+          <a:lnRef idx="2">
+            <a:schemeClr val="accent1">
+              <a:shade val="50000"/>
+            </a:schemeClr>
+          </a:lnRef>
+          <a:fillRef idx="1">
+            <a:schemeClr val="accent1"/>
+          </a:fillRef>
+          <a:effectRef idx="0">
+            <a:schemeClr val="accent1"/>
+          </a:effectRef>
+          <a:fontRef idx="minor">
+            <a:schemeClr val="lt1"/>
+          </a:fontRef>
+        </p:style>
+        <p:txBody>
+          <a:bodyPr rtlCol="0" anchor="ctr"/>
+          <a:lstStyle/>
+          <a:p>
+            <a:pPr algn="ctr"/>
+            <a:r>
+              <a:rPr lang="it-IT" sz="1400" dirty="0"/>
+              <a:t>Somma delle ore di ricarica e dell’ora in cui sei</a:t>
+            </a:r>
+          </a:p>
+        </p:txBody>
+      </p:sp>
+      <p:cxnSp>
+        <p:nvCxnSpPr>
+          <p:cNvPr id="27" name="Connettore a gomito 26">
+            <a:extLst>
+              <a:ext uri="{FF2B5EF4-FFF2-40B4-BE49-F238E27FC236}">
+                <a16:creationId xmlns:a16="http://schemas.microsoft.com/office/drawing/2014/main" id="{DA8A9131-92AE-4E7B-A128-E68FFA452E25}"/>
+              </a:ext>
+            </a:extLst>
+          </p:cNvPr>
+          <p:cNvCxnSpPr>
+            <a:cxnSpLocks/>
+            <a:stCxn id="21" idx="3"/>
+            <a:endCxn id="7" idx="3"/>
+          </p:cNvCxnSpPr>
+          <p:nvPr/>
+        </p:nvCxnSpPr>
+        <p:spPr>
+          <a:xfrm flipH="1" flipV="1">
+            <a:off x="5195114" y="1921949"/>
+            <a:ext cx="218292" cy="3668041"/>
+          </a:xfrm>
+          <a:prstGeom prst="bentConnector3">
+            <a:avLst>
+              <a:gd name="adj1" fmla="val -678417"/>
+            </a:avLst>
+          </a:prstGeom>
+          <a:ln>
+            <a:tailEnd type="triangle"/>
+          </a:ln>
+        </p:spPr>
+        <p:style>
+          <a:lnRef idx="1">
+            <a:schemeClr val="accent1"/>
+          </a:lnRef>
+          <a:fillRef idx="0">
+            <a:schemeClr val="accent1"/>
+          </a:fillRef>
+          <a:effectRef idx="0">
+            <a:schemeClr val="accent1"/>
+          </a:effectRef>
+          <a:fontRef idx="minor">
+            <a:schemeClr val="tx1"/>
+          </a:fontRef>
+        </p:style>
+      </p:cxnSp>
+      <p:cxnSp>
+        <p:nvCxnSpPr>
+          <p:cNvPr id="29" name="Connettore 2 28">
+            <a:extLst>
+              <a:ext uri="{FF2B5EF4-FFF2-40B4-BE49-F238E27FC236}">
+                <a16:creationId xmlns:a16="http://schemas.microsoft.com/office/drawing/2014/main" id="{8FB75BC0-E468-4AC7-9949-2B4D80A88ADE}"/>
+              </a:ext>
+            </a:extLst>
+          </p:cNvPr>
+          <p:cNvCxnSpPr>
+            <a:cxnSpLocks/>
+            <a:stCxn id="11" idx="2"/>
+            <a:endCxn id="19" idx="0"/>
+          </p:cNvCxnSpPr>
+          <p:nvPr/>
+        </p:nvCxnSpPr>
+        <p:spPr>
+          <a:xfrm flipH="1">
+            <a:off x="4326757" y="3955775"/>
+            <a:ext cx="1" cy="330533"/>
+          </a:xfrm>
+          <a:prstGeom prst="straightConnector1">
+            <a:avLst/>
+          </a:prstGeom>
+          <a:ln>
+            <a:tailEnd type="triangle"/>
+          </a:ln>
+        </p:spPr>
+        <p:style>
+          <a:lnRef idx="1">
+            <a:schemeClr val="accent1"/>
+          </a:lnRef>
+          <a:fillRef idx="0">
+            <a:schemeClr val="accent1"/>
+          </a:fillRef>
+          <a:effectRef idx="0">
+            <a:schemeClr val="accent1"/>
+          </a:effectRef>
+          <a:fontRef idx="minor">
+            <a:schemeClr val="tx1"/>
+          </a:fontRef>
+        </p:style>
+      </p:cxnSp>
+      <p:cxnSp>
+        <p:nvCxnSpPr>
+          <p:cNvPr id="31" name="Connettore 2 30">
+            <a:extLst>
+              <a:ext uri="{FF2B5EF4-FFF2-40B4-BE49-F238E27FC236}">
+                <a16:creationId xmlns:a16="http://schemas.microsoft.com/office/drawing/2014/main" id="{1461C344-E753-4E10-9E52-09EFB02C44C5}"/>
+              </a:ext>
+            </a:extLst>
+          </p:cNvPr>
+          <p:cNvCxnSpPr>
+            <a:cxnSpLocks/>
+            <a:stCxn id="19" idx="2"/>
+            <a:endCxn id="21" idx="0"/>
+          </p:cNvCxnSpPr>
+          <p:nvPr/>
+        </p:nvCxnSpPr>
+        <p:spPr>
+          <a:xfrm>
+            <a:off x="4326757" y="4977705"/>
+            <a:ext cx="0" cy="328506"/>
+          </a:xfrm>
+          <a:prstGeom prst="straightConnector1">
+            <a:avLst/>
+          </a:prstGeom>
+          <a:ln>
+            <a:tailEnd type="triangle"/>
+          </a:ln>
+        </p:spPr>
+        <p:style>
+          <a:lnRef idx="1">
+            <a:schemeClr val="accent1"/>
+          </a:lnRef>
+          <a:fillRef idx="0">
+            <a:schemeClr val="accent1"/>
+          </a:fillRef>
+          <a:effectRef idx="0">
+            <a:schemeClr val="accent1"/>
+          </a:effectRef>
+          <a:fontRef idx="minor">
+            <a:schemeClr val="tx1"/>
+          </a:fontRef>
+        </p:style>
+      </p:cxnSp>
+      <p:sp>
+        <p:nvSpPr>
+          <p:cNvPr id="60" name="CasellaDiTesto 59">
+            <a:extLst>
+              <a:ext uri="{FF2B5EF4-FFF2-40B4-BE49-F238E27FC236}">
+                <a16:creationId xmlns:a16="http://schemas.microsoft.com/office/drawing/2014/main" id="{4C572A3E-280E-5046-BDDA-E510ED2F6A29}"/>
+              </a:ext>
+            </a:extLst>
+          </p:cNvPr>
+          <p:cNvSpPr txBox="1"/>
+          <p:nvPr/>
+        </p:nvSpPr>
+        <p:spPr>
+          <a:xfrm>
+            <a:off x="6900175" y="3591194"/>
+            <a:ext cx="936475" cy="369332"/>
+          </a:xfrm>
+          <a:prstGeom prst="rect">
+            <a:avLst/>
+          </a:prstGeom>
+          <a:noFill/>
+        </p:spPr>
+        <p:txBody>
+          <a:bodyPr wrap="none" rtlCol="0">
+            <a:spAutoFit/>
+          </a:bodyPr>
+          <a:lstStyle/>
+          <a:p>
+            <a:r>
+              <a:rPr lang="it-IT" dirty="0"/>
+              <a:t> &lt; 24:00</a:t>
+            </a:r>
+          </a:p>
+        </p:txBody>
+      </p:sp>
+      <p:sp>
+        <p:nvSpPr>
+          <p:cNvPr id="72" name="CasellaDiTesto 71">
+            <a:extLst>
+              <a:ext uri="{FF2B5EF4-FFF2-40B4-BE49-F238E27FC236}">
+                <a16:creationId xmlns:a16="http://schemas.microsoft.com/office/drawing/2014/main" id="{9009DD39-27AC-3D4A-BA83-2FD40A940DE5}"/>
+              </a:ext>
+            </a:extLst>
+          </p:cNvPr>
+          <p:cNvSpPr txBox="1"/>
+          <p:nvPr/>
+        </p:nvSpPr>
+        <p:spPr>
+          <a:xfrm>
+            <a:off x="743603" y="3571303"/>
+            <a:ext cx="936475" cy="369332"/>
+          </a:xfrm>
+          <a:prstGeom prst="rect">
+            <a:avLst/>
+          </a:prstGeom>
+          <a:noFill/>
+        </p:spPr>
+        <p:txBody>
+          <a:bodyPr wrap="none" rtlCol="0">
+            <a:spAutoFit/>
+          </a:bodyPr>
+          <a:lstStyle/>
+          <a:p>
+            <a:r>
+              <a:rPr lang="it-IT" dirty="0"/>
+              <a:t> = 24:00</a:t>
+            </a:r>
+          </a:p>
+        </p:txBody>
+      </p:sp>
+      <p:cxnSp>
+        <p:nvCxnSpPr>
+          <p:cNvPr id="81" name="Connettore a gomito 26">
+            <a:extLst>
+              <a:ext uri="{FF2B5EF4-FFF2-40B4-BE49-F238E27FC236}">
+                <a16:creationId xmlns:a16="http://schemas.microsoft.com/office/drawing/2014/main" id="{C239FA74-D532-8C46-A7AC-B749235A37EF}"/>
+              </a:ext>
+            </a:extLst>
+          </p:cNvPr>
+          <p:cNvCxnSpPr>
+            <a:cxnSpLocks/>
+            <a:stCxn id="21" idx="2"/>
+            <a:endCxn id="5" idx="2"/>
+          </p:cNvCxnSpPr>
+          <p:nvPr/>
+        </p:nvCxnSpPr>
+        <p:spPr>
+          <a:xfrm rot="5400000" flipH="1">
+            <a:off x="1339519" y="2886531"/>
+            <a:ext cx="5083191" cy="891284"/>
+          </a:xfrm>
+          <a:prstGeom prst="bentConnector4">
+            <a:avLst>
+              <a:gd name="adj1" fmla="val -4497"/>
+              <a:gd name="adj2" fmla="val 305919"/>
+            </a:avLst>
+          </a:prstGeom>
+          <a:ln>
+            <a:tailEnd type="triangle"/>
+          </a:ln>
+        </p:spPr>
+        <p:style>
+          <a:lnRef idx="1">
+            <a:schemeClr val="accent1"/>
+          </a:lnRef>
+          <a:fillRef idx="0">
+            <a:schemeClr val="accent1"/>
+          </a:fillRef>
+          <a:effectRef idx="0">
+            <a:schemeClr val="accent1"/>
+          </a:effectRef>
+          <a:fontRef idx="minor">
+            <a:schemeClr val="tx1"/>
+          </a:fontRef>
+        </p:style>
+      </p:cxnSp>
+    </p:spTree>
+    <p:extLst>
+      <p:ext uri="{BB962C8B-B14F-4D97-AF65-F5344CB8AC3E}">
+        <p14:creationId xmlns:p14="http://schemas.microsoft.com/office/powerpoint/2010/main" val="1057850811"/>
+      </p:ext>
+    </p:extLst>
+  </p:cSld>
+  <p:clrMapOvr>
+    <a:masterClrMapping/>
+  </p:clrMapOvr>
+</p:sld>
+</file>
+
 <file path=ppt/theme/theme1.xml><?xml version="1.0" encoding="utf-8"?>
 <a:theme xmlns:a="http://schemas.openxmlformats.org/drawingml/2006/main" name="Tema di Office">
   <a:themeElements>

</xml_diff>